<commit_message>
Minor changes to the presentation
</commit_message>
<xml_diff>
--- a/Seminar Präsentation.pptx
+++ b/Seminar Präsentation.pptx
@@ -369,7 +369,7 @@
           <a:p>
             <a:fld id="{06142896-080E-4476-B7E7-8A564633D8B4}" type="datetime1">
               <a:rPr lang="de-DE" smtClean="0"/>
-              <a:t>17.02.2025</a:t>
+              <a:t>26.02.2025</a:t>
             </a:fld>
             <a:endParaRPr lang="de-DE"/>
           </a:p>
@@ -13874,7 +13874,7 @@
                 </a:solidFill>
                 <a:sym typeface="Wingdings" panose="05000000000000000000" pitchFamily="2" charset="2"/>
               </a:rPr>
-              <a:t>Shell hat Berufung eingelegt  Shell muss seinen CO2-Ausstoß doch nicht drastisch reduzieren  Mangel an verlässliche Berechnungsgrundlage für die Zahl von 45%</a:t>
+              <a:t>Shell hat Berufung eingelegt  Shell muss seinen CO₂ -Ausstoß doch nicht drastisch reduzieren  Mangel an verlässliche Berechnungsgrundlage für die Zahl von 45%</a:t>
             </a:r>
           </a:p>
         </p:txBody>
@@ -14347,7 +14347,7 @@
                 </a:solidFill>
                 <a:sym typeface="Wingdings" panose="05000000000000000000" pitchFamily="2" charset="2"/>
               </a:rPr>
-              <a:t>Wegweisendes Verfahren für die Klimagerechtigkeit und Haftung großer CO2-Emittenten</a:t>
+              <a:t>Wegweisendes Verfahren für die Klimagerechtigkeit und Haftung großer CO₂ -Emittenten</a:t>
             </a:r>
           </a:p>
           <a:p>

</xml_diff>

<commit_message>
Small changes in the presentation
</commit_message>
<xml_diff>
--- a/Seminar Präsentation.pptx
+++ b/Seminar Präsentation.pptx
@@ -369,7 +369,7 @@
           <a:p>
             <a:fld id="{06142896-080E-4476-B7E7-8A564633D8B4}" type="datetime1">
               <a:rPr lang="de-DE" smtClean="0"/>
-              <a:t>26.02.2025</a:t>
+              <a:t>10.03.2025</a:t>
             </a:fld>
             <a:endParaRPr lang="de-DE"/>
           </a:p>
@@ -8466,23 +8466,7 @@
                   <a:schemeClr val="dk2"/>
                 </a:solidFill>
               </a:rPr>
-              <a:t>Paris Agreement. ”Paris Agreement“. In: Report of the Conference </a:t>
-            </a:r>
-            <a:r>
-              <a:rPr lang="en-US" sz="1000" dirty="0" err="1">
-                <a:solidFill>
-                  <a:schemeClr val="dk2"/>
-                </a:solidFill>
-              </a:rPr>
-              <a:t>ofthe</a:t>
-            </a:r>
-            <a:r>
-              <a:rPr lang="en-US" sz="1000" dirty="0">
-                <a:solidFill>
-                  <a:schemeClr val="dk2"/>
-                </a:solidFill>
-              </a:rPr>
-              <a:t> Parties to the United Nations Framework Convention on </a:t>
+              <a:t>Paris Agreement. ”Paris Agreement“. In: Report of the Conference of the Parties to the United Nations Framework Convention on </a:t>
             </a:r>
             <a:r>
               <a:rPr lang="en-US" sz="1000" dirty="0" err="1">
@@ -12998,21 +12982,6 @@
                 <a:sym typeface="Wingdings" panose="05000000000000000000" pitchFamily="2" charset="2"/>
               </a:rPr>
               <a:t>Unternehmensverantwortung</a:t>
-            </a:r>
-          </a:p>
-          <a:p>
-            <a:pPr marL="742950" lvl="1" indent="-285750">
-              <a:buFont typeface="Arial" panose="020B0604020202020204" pitchFamily="34" charset="0"/>
-              <a:buChar char="•"/>
-            </a:pPr>
-            <a:r>
-              <a:rPr lang="de-DE" sz="1800" dirty="0">
-                <a:solidFill>
-                  <a:schemeClr val="dk2"/>
-                </a:solidFill>
-                <a:sym typeface="Wingdings" panose="05000000000000000000" pitchFamily="2" charset="2"/>
-              </a:rPr>
-              <a:t>…</a:t>
             </a:r>
           </a:p>
         </p:txBody>

</xml_diff>

<commit_message>
Small change in the presentation, will have to expand the presentation to make it acceptibly long enough
</commit_message>
<xml_diff>
--- a/Seminar Präsentation.pptx
+++ b/Seminar Präsentation.pptx
@@ -369,7 +369,7 @@
           <a:p>
             <a:fld id="{06142896-080E-4476-B7E7-8A564633D8B4}" type="datetime1">
               <a:rPr lang="de-DE" smtClean="0"/>
-              <a:t>10.03.2025</a:t>
+              <a:t>20.03.2025</a:t>
             </a:fld>
             <a:endParaRPr lang="de-DE"/>
           </a:p>
@@ -15073,7 +15073,7 @@
                 </a:solidFill>
                 <a:sym typeface="Wingdings" panose="05000000000000000000" pitchFamily="2" charset="2"/>
               </a:rPr>
-              <a:t>Ziel: Forderung, die CO2-Emissionen bis 2020 um mindestens 25 % gegenüber 1990 zu senken  Urteile 2015 und 2018: Staat verpflichtet, die Emissionen zu reduzieren</a:t>
+              <a:t>Ziel: Forderung, die CO₂ -Emissionen bis 2020 um mindestens 25 % gegenüber 1990 zu senken  Urteile 2015 und 2018: Staat verpflichtet, die Emissionen zu reduzieren</a:t>
             </a:r>
           </a:p>
           <a:p>

</xml_diff>